<commit_message>
Added github URL to pptx
</commit_message>
<xml_diff>
--- a/presentations/Technical Presentation.pptx
+++ b/presentations/Technical Presentation.pptx
@@ -11739,7 +11739,7 @@
           <a:p>
             <a:fld id="{3FE6697D-3EB9-4947-8C4B-5F1F4C3EC06B}" type="datetimeFigureOut">
               <a:rPr lang="en-US" smtClean="0"/>
-              <a:t>8/17/2018</a:t>
+              <a:t>8/18/2018</a:t>
             </a:fld>
             <a:endParaRPr lang="en-US"/>
           </a:p>
@@ -12615,7 +12615,7 @@
           <a:graphicData uri="http://schemas.openxmlformats.org/presentationml/2006/ole">
             <mc:AlternateContent xmlns:mc="http://schemas.openxmlformats.org/markup-compatibility/2006">
               <mc:Choice xmlns:v="urn:schemas-microsoft-com:vml" Requires="v">
-                <p:oleObj spid="_x0000_s1114" name="think-cell Slide" r:id="rId7" imgW="344" imgH="344" progId="TCLayout.ActiveDocument.1">
+                <p:oleObj spid="_x0000_s1115" name="think-cell Slide" r:id="rId7" imgW="344" imgH="344" progId="TCLayout.ActiveDocument.1">
                   <p:embed/>
                 </p:oleObj>
               </mc:Choice>
@@ -15391,7 +15391,7 @@
         <p:spPr>
           <a:xfrm>
             <a:off x="335902" y="839755"/>
-            <a:ext cx="4254759" cy="3137910"/>
+            <a:ext cx="4254759" cy="3414781"/>
           </a:xfrm>
           <a:prstGeom prst="rect">
             <a:avLst/>
@@ -15471,7 +15471,13 @@
             </a:r>
             <a:r>
               <a:rPr lang="en-ZA"/>
-              <a:t>are available.</a:t>
+              <a:t>are available at </a:t>
+            </a:r>
+            <a:r>
+              <a:rPr lang="en-ZA">
+                <a:hlinkClick r:id="rId3"/>
+              </a:rPr>
+              <a:t>https://github.com/lvanv/CaseStudy</a:t>
             </a:r>
             <a:endParaRPr lang="en-ZA" dirty="0"/>
           </a:p>

</xml_diff>